<commit_message>
Small change on presentation
Signed-off-by: Konstantin Preusser <konstantin.preusser@gmx.de>
</commit_message>
<xml_diff>
--- a/presentation/LLM FINETUNING_final.pptx
+++ b/presentation/LLM FINETUNING_final.pptx
@@ -24793,6 +24793,112 @@
   <p:clrMapOvr>
     <a:masterClrMapping/>
   </p:clrMapOvr>
+  <p:timing>
+    <p:tnLst>
+      <p:par>
+        <p:cTn id="1" dur="indefinite" restart="never" nodeType="tmRoot">
+          <p:childTnLst>
+            <p:seq concurrent="1" nextAc="seek">
+              <p:cTn id="2" dur="indefinite" nodeType="mainSeq">
+                <p:childTnLst>
+                  <p:par>
+                    <p:cTn id="3" fill="hold">
+                      <p:stCondLst>
+                        <p:cond delay="indefinite"/>
+                      </p:stCondLst>
+                      <p:childTnLst>
+                        <p:par>
+                          <p:cTn id="4" fill="hold">
+                            <p:stCondLst>
+                              <p:cond delay="0"/>
+                            </p:stCondLst>
+                            <p:childTnLst>
+                              <p:par>
+                                <p:cTn id="5" presetID="1" presetClass="entr" presetSubtype="0" fill="hold" grpId="0" nodeType="clickEffect">
+                                  <p:stCondLst>
+                                    <p:cond delay="0"/>
+                                  </p:stCondLst>
+                                  <p:childTnLst>
+                                    <p:set>
+                                      <p:cBhvr>
+                                        <p:cTn id="6" dur="1" fill="hold">
+                                          <p:stCondLst>
+                                            <p:cond delay="0"/>
+                                          </p:stCondLst>
+                                        </p:cTn>
+                                        <p:tgtEl>
+                                          <p:spTgt spid="9"/>
+                                        </p:tgtEl>
+                                        <p:attrNameLst>
+                                          <p:attrName>style.visibility</p:attrName>
+                                        </p:attrNameLst>
+                                      </p:cBhvr>
+                                      <p:to>
+                                        <p:strVal val="visible"/>
+                                      </p:to>
+                                    </p:set>
+                                  </p:childTnLst>
+                                </p:cTn>
+                              </p:par>
+                              <p:par>
+                                <p:cTn id="7" presetID="1" presetClass="entr" presetSubtype="0" fill="hold" grpId="0" nodeType="withEffect">
+                                  <p:stCondLst>
+                                    <p:cond delay="0"/>
+                                  </p:stCondLst>
+                                  <p:childTnLst>
+                                    <p:set>
+                                      <p:cBhvr>
+                                        <p:cTn id="8" dur="1" fill="hold">
+                                          <p:stCondLst>
+                                            <p:cond delay="0"/>
+                                          </p:stCondLst>
+                                        </p:cTn>
+                                        <p:tgtEl>
+                                          <p:spTgt spid="6"/>
+                                        </p:tgtEl>
+                                        <p:attrNameLst>
+                                          <p:attrName>style.visibility</p:attrName>
+                                        </p:attrNameLst>
+                                      </p:cBhvr>
+                                      <p:to>
+                                        <p:strVal val="visible"/>
+                                      </p:to>
+                                    </p:set>
+                                  </p:childTnLst>
+                                </p:cTn>
+                              </p:par>
+                            </p:childTnLst>
+                          </p:cTn>
+                        </p:par>
+                      </p:childTnLst>
+                    </p:cTn>
+                  </p:par>
+                </p:childTnLst>
+              </p:cTn>
+              <p:prevCondLst>
+                <p:cond evt="onPrev" delay="0">
+                  <p:tgtEl>
+                    <p:sldTgt/>
+                  </p:tgtEl>
+                </p:cond>
+              </p:prevCondLst>
+              <p:nextCondLst>
+                <p:cond evt="onNext" delay="0">
+                  <p:tgtEl>
+                    <p:sldTgt/>
+                  </p:tgtEl>
+                </p:cond>
+              </p:nextCondLst>
+            </p:seq>
+          </p:childTnLst>
+        </p:cTn>
+      </p:par>
+    </p:tnLst>
+    <p:bldLst>
+      <p:bldP spid="9" grpId="0" animBg="1"/>
+      <p:bldP spid="6" grpId="0" animBg="1"/>
+    </p:bldLst>
+  </p:timing>
 </p:sld>
 </file>
 
@@ -25300,7 +25406,7 @@
         <p:spPr>
           <a:xfrm>
             <a:off x="880166" y="2227948"/>
-            <a:ext cx="4522241" cy="552959"/>
+            <a:ext cx="4522241" cy="670700"/>
           </a:xfrm>
           <a:prstGeom prst="rect">
             <a:avLst/>
@@ -25498,8 +25604,8 @@
         </p:nvSpPr>
         <p:spPr>
           <a:xfrm>
-            <a:off x="6693031" y="2227948"/>
-            <a:ext cx="4163945" cy="552959"/>
+            <a:off x="6702175" y="2227948"/>
+            <a:ext cx="4163945" cy="670700"/>
           </a:xfrm>
           <a:prstGeom prst="rect">
             <a:avLst/>

</xml_diff>